<commit_message>
Slides: removed methods fix
branch: update-2020
</commit_message>
<xml_diff>
--- a/mocks-for-testers.pptx
+++ b/mocks-for-testers.pptx
@@ -273,6 +273,14 @@
     </p:extLst>
   </p:cmAuthor>
 </p:cmAuthorLst>
+</file>
+
+<file path=ppt/revisionInfo.xml><?xml version="1.0" encoding="utf-8"?>
+<p1510:revInfo xmlns:a="http://schemas.openxmlformats.org/drawingml/2006/main" xmlns:r="http://schemas.openxmlformats.org/officeDocument/2006/relationships" xmlns:p1510="http://schemas.microsoft.com/office/powerpoint/2015/10/main">
+  <p1510:revLst>
+    <p1510:client id="{671C8AC8-0118-49BC-BEAA-FA132DEFB8FC}" v="34" dt="2020-10-03T10:34:22.657"/>
+  </p1510:revLst>
+</p1510:revInfo>
 </file>
 
 <file path=ppt/diagrams/colors1.xml><?xml version="1.0" encoding="utf-8"?>
@@ -4975,7 +4983,7 @@
           <a:p>
             <a:fld id="{1D12B38D-150E-44F0-AD67-CE4A0E7D73CD}" type="datetimeFigureOut">
               <a:rPr lang="ru-RU" smtClean="0"/>
-              <a:t>20.06.2020</a:t>
+              <a:t>03.10.2020</a:t>
             </a:fld>
             <a:endParaRPr lang="ru-RU"/>
           </a:p>
@@ -5875,42 +5883,60 @@
           <a:bodyPr/>
           <a:lstStyle/>
           <a:p>
-            <a:pPr marL="0" marR="0" lvl="0" indent="0" algn="l" defTabSz="914400" rtl="0" eaLnBrk="1" fontAlgn="auto" latinLnBrk="0" hangingPunct="1">
-              <a:lnSpc>
-                <a:spcPct val="100000"/>
-              </a:lnSpc>
-              <a:spcBef>
-                <a:spcPts val="0"/>
-              </a:spcBef>
-              <a:spcAft>
-                <a:spcPts val="0"/>
-              </a:spcAft>
-              <a:buClrTx/>
-              <a:buSzTx/>
-              <a:buFontTx/>
-              <a:buNone/>
-              <a:tabLst/>
+            <a:pPr>
               <a:defRPr/>
             </a:pPr>
             <a:r>
-              <a:rPr lang="ru-RU" baseline="0" dirty="0"/>
-              <a:t>В </a:t>
-            </a:r>
-            <a:r>
-              <a:rPr lang="en-US" baseline="0" dirty="0" err="1"/>
-              <a:t>MustHaveHappened</a:t>
-            </a:r>
-            <a:r>
-              <a:rPr lang="en-US" baseline="0" dirty="0"/>
-              <a:t> </a:t>
-            </a:r>
-            <a:r>
-              <a:rPr lang="ru-RU" baseline="0" dirty="0"/>
-              <a:t>можно передать, сколько раз мы ожидали вызов.</a:t>
-            </a:r>
-          </a:p>
-          <a:p>
-            <a:endParaRPr lang="ru-RU" baseline="0" dirty="0"/>
+              <a:rPr lang="ru-RU" dirty="0">
+                <a:cs typeface="Calibri"/>
+              </a:rPr>
+              <a:t>Синтаксический сахар для 1/2 вызовов точно/больше/меньше</a:t>
+            </a:r>
+            <a:endParaRPr lang="ru-RU" dirty="0"/>
+          </a:p>
+          <a:p>
+            <a:pPr>
+              <a:defRPr/>
+            </a:pPr>
+            <a:r>
+              <a:rPr lang="ru-RU" dirty="0"/>
+              <a:t>- </a:t>
+            </a:r>
+            <a:r>
+              <a:rPr lang="ru-RU" dirty="0" err="1"/>
+              <a:t>MustHaveHappenedOnceExactly</a:t>
+            </a:r>
+            <a:endParaRPr lang="ru-RU" dirty="0" err="1">
+              <a:cs typeface="Calibri"/>
+            </a:endParaRPr>
+          </a:p>
+          <a:p>
+            <a:r>
+              <a:rPr lang="ru-RU" dirty="0"/>
+              <a:t>- </a:t>
+            </a:r>
+            <a:r>
+              <a:rPr lang="ru-RU" dirty="0" err="1"/>
+              <a:t>MustHaveHappenedOnceOrMore</a:t>
+            </a:r>
+            <a:endParaRPr lang="ru-RU" dirty="0" err="1">
+              <a:cs typeface="Calibri" panose="020F0502020204030204"/>
+            </a:endParaRPr>
+          </a:p>
+          <a:p>
+            <a:r>
+              <a:rPr lang="ru-RU" dirty="0"/>
+              <a:t>- </a:t>
+            </a:r>
+            <a:r>
+              <a:rPr lang="ru-RU" dirty="0" err="1"/>
+              <a:t>MustHaveHappenedOnceOrLess</a:t>
+            </a:r>
+          </a:p>
+          <a:p>
+            <a:endParaRPr lang="ru-RU" dirty="0">
+              <a:cs typeface="Calibri" panose="020F0502020204030204"/>
+            </a:endParaRPr>
           </a:p>
         </p:txBody>
       </p:sp>
@@ -23253,7 +23279,7 @@
         </p:nvSpPr>
         <p:spPr/>
         <p:txBody>
-          <a:bodyPr>
+          <a:bodyPr vert="horz" lIns="91440" tIns="45720" rIns="91440" bIns="45720" rtlCol="0" anchor="t">
             <a:normAutofit/>
           </a:bodyPr>
           <a:lstStyle/>
@@ -23418,7 +23444,8 @@
           <a:p>
             <a:r>
               <a:rPr lang="en-US" sz="2600" dirty="0">
-                <a:latin typeface="Consolas" panose="020B0609020204030204" pitchFamily="49" charset="0"/>
+                <a:latin typeface="Consolas"/>
+                <a:cs typeface="Segoe UI"/>
               </a:rPr>
               <a:t>	.</a:t>
             </a:r>
@@ -23427,28 +23454,17 @@
                 <a:solidFill>
                   <a:srgbClr val="2B91AF"/>
                 </a:solidFill>
-                <a:latin typeface="Consolas" panose="020B0609020204030204" pitchFamily="49" charset="0"/>
-                <a:cs typeface="Consolas" panose="020B0609020204030204" pitchFamily="49" charset="0"/>
-              </a:rPr>
-              <a:t>MustHaveHappened</a:t>
+                <a:latin typeface="Consolas"/>
+                <a:cs typeface="Segoe UI"/>
+              </a:rPr>
+              <a:t>MustHaveHappenedTwiceExactly</a:t>
             </a:r>
             <a:r>
               <a:rPr lang="en-US" sz="2600" dirty="0">
-                <a:latin typeface="Consolas" panose="020B0609020204030204" pitchFamily="49" charset="0"/>
-              </a:rPr>
-              <a:t>(</a:t>
-            </a:r>
-            <a:r>
-              <a:rPr lang="en-US" sz="2600" b="1" dirty="0" err="1">
-                <a:latin typeface="Consolas" panose="020B0609020204030204" pitchFamily="49" charset="0"/>
-              </a:rPr>
-              <a:t>Repeated.Exactly.Twice</a:t>
-            </a:r>
-            <a:r>
-              <a:rPr lang="en-US" sz="2600" dirty="0">
-                <a:latin typeface="Consolas" panose="020B0609020204030204" pitchFamily="49" charset="0"/>
-              </a:rPr>
-              <a:t>)</a:t>
+                <a:latin typeface="Consolas"/>
+                <a:cs typeface="Segoe UI"/>
+              </a:rPr>
+              <a:t>()</a:t>
             </a:r>
           </a:p>
           <a:p>

</xml_diff>